<commit_message>
Add 201 status code
</commit_message>
<xml_diff>
--- a/Module 2/Unit 1 Securing APIs with Basic Auth/Workshop 1 Restful APIs and Frameworks/2.1.1 Restful APIs and Frameworks.pptx
+++ b/Module 2/Unit 1 Securing APIs with Basic Auth/Workshop 1 Restful APIs and Frameworks/2.1.1 Restful APIs and Frameworks.pptx
@@ -114,6 +114,11 @@
       </a:defRPr>
     </a:lvl9pPr>
   </p:defaultTextStyle>
+  <p:extLst>
+    <p:ext uri="{EFAFB233-063F-42B5-8137-9DF3F51BA10A}">
+      <p15:sldGuideLst xmlns:p15="http://schemas.microsoft.com/office/powerpoint/2012/main"/>
+    </p:ext>
+  </p:extLst>
 </p:presentation>
 </file>
 
@@ -770,6 +775,49 @@
               </a:rPr>
               <a:t>200 Success!</a:t>
             </a:r>
+          </a:p>
+          <a:p>
+            <a:pPr algn="l">
+              <a:buFont typeface="Arial" panose="020B0604020202020204" pitchFamily="34" charset="0"/>
+              <a:buChar char="•"/>
+            </a:pPr>
+            <a:r>
+              <a:rPr lang="en-GB" b="0" i="0">
+                <a:solidFill>
+                  <a:srgbClr val="000000"/>
+                </a:solidFill>
+                <a:effectLst/>
+                <a:latin typeface="Raleway" panose="020B0604020202020204" pitchFamily="2" charset="0"/>
+              </a:rPr>
+              <a:t>201 Success </a:t>
+            </a:r>
+            <a:r>
+              <a:rPr lang="en-GB" b="0" i="0" dirty="0">
+                <a:solidFill>
+                  <a:srgbClr val="000000"/>
+                </a:solidFill>
+                <a:effectLst/>
+                <a:latin typeface="Raleway" panose="020B0604020202020204" pitchFamily="2" charset="0"/>
+              </a:rPr>
+              <a:t>and a new resource has </a:t>
+            </a:r>
+            <a:r>
+              <a:rPr lang="en-GB" b="0" i="0">
+                <a:solidFill>
+                  <a:srgbClr val="000000"/>
+                </a:solidFill>
+                <a:effectLst/>
+                <a:latin typeface="Raleway" panose="020B0604020202020204" pitchFamily="2" charset="0"/>
+              </a:rPr>
+              <a:t>been created!</a:t>
+            </a:r>
+            <a:endParaRPr lang="en-GB" b="0" i="0" dirty="0">
+              <a:solidFill>
+                <a:srgbClr val="000000"/>
+              </a:solidFill>
+              <a:effectLst/>
+              <a:latin typeface="Raleway" panose="020B0604020202020204" pitchFamily="2" charset="0"/>
+            </a:endParaRPr>
           </a:p>
           <a:p>
             <a:pPr algn="l">
@@ -10736,7 +10784,7 @@
           <p:nvPr>
             <p:extLst>
               <p:ext uri="{D42A27DB-BD31-4B8C-83A1-F6EECF244321}">
-                <p14:modId xmlns:p14="http://schemas.microsoft.com/office/powerpoint/2010/main" val="259225972"/>
+                <p14:modId xmlns:p14="http://schemas.microsoft.com/office/powerpoint/2010/main" val="190957185"/>
               </p:ext>
             </p:extLst>
           </p:nvPr>
@@ -10810,7 +10858,7 @@
                       <a:pPr algn="ctr"/>
                       <a:r>
                         <a:rPr lang="en-GB" sz="3100"/>
-                        <a:t>200</a:t>
+                        <a:t>200/201</a:t>
                       </a:r>
                     </a:p>
                   </a:txBody>

</xml_diff>